<commit_message>
Make changes to humanPerformAttack sequence diagram
</commit_message>
<xml_diff>
--- a/docs/diagrams/HumanPerformAttackSequenceDiagram.pptx
+++ b/docs/diagrams/HumanPerformAttackSequenceDiagram.pptx
@@ -53,7 +53,7 @@
       </p:grpSpPr>
       <p:sp>
         <p:nvSpPr>
-          <p:cNvPr id="23" name="PlaceHolder 1"/>
+          <p:cNvPr id="21" name="PlaceHolder 1"/>
           <p:cNvSpPr>
             <a:spLocks noGrp="1"/>
           </p:cNvSpPr>
@@ -82,7 +82,7 @@
       </p:sp>
       <p:sp>
         <p:nvSpPr>
-          <p:cNvPr id="24" name="PlaceHolder 2"/>
+          <p:cNvPr id="22" name="PlaceHolder 2"/>
           <p:cNvSpPr>
             <a:spLocks noGrp="1"/>
           </p:cNvSpPr>
@@ -112,7 +112,7 @@
       </p:sp>
       <p:sp>
         <p:nvSpPr>
-          <p:cNvPr id="25" name="PlaceHolder 3"/>
+          <p:cNvPr id="23" name="PlaceHolder 3"/>
           <p:cNvSpPr>
             <a:spLocks noGrp="1"/>
           </p:cNvSpPr>
@@ -164,7 +164,7 @@
       </p:grpSpPr>
       <p:sp>
         <p:nvSpPr>
-          <p:cNvPr id="26" name="PlaceHolder 1"/>
+          <p:cNvPr id="24" name="PlaceHolder 1"/>
           <p:cNvSpPr>
             <a:spLocks noGrp="1"/>
           </p:cNvSpPr>
@@ -193,7 +193,7 @@
       </p:sp>
       <p:sp>
         <p:nvSpPr>
-          <p:cNvPr id="27" name="PlaceHolder 2"/>
+          <p:cNvPr id="25" name="PlaceHolder 2"/>
           <p:cNvSpPr>
             <a:spLocks noGrp="1"/>
           </p:cNvSpPr>
@@ -223,7 +223,7 @@
       </p:sp>
       <p:sp>
         <p:nvSpPr>
-          <p:cNvPr id="28" name="PlaceHolder 3"/>
+          <p:cNvPr id="26" name="PlaceHolder 3"/>
           <p:cNvSpPr>
             <a:spLocks noGrp="1"/>
           </p:cNvSpPr>
@@ -253,7 +253,7 @@
       </p:sp>
       <p:sp>
         <p:nvSpPr>
-          <p:cNvPr id="29" name="PlaceHolder 4"/>
+          <p:cNvPr id="27" name="PlaceHolder 4"/>
           <p:cNvSpPr>
             <a:spLocks noGrp="1"/>
           </p:cNvSpPr>
@@ -283,7 +283,7 @@
       </p:sp>
       <p:sp>
         <p:nvSpPr>
-          <p:cNvPr id="30" name="PlaceHolder 5"/>
+          <p:cNvPr id="28" name="PlaceHolder 5"/>
           <p:cNvSpPr>
             <a:spLocks noGrp="1"/>
           </p:cNvSpPr>
@@ -335,7 +335,7 @@
       </p:grpSpPr>
       <p:sp>
         <p:nvSpPr>
-          <p:cNvPr id="31" name="PlaceHolder 1"/>
+          <p:cNvPr id="29" name="PlaceHolder 1"/>
           <p:cNvSpPr>
             <a:spLocks noGrp="1"/>
           </p:cNvSpPr>
@@ -364,7 +364,7 @@
       </p:sp>
       <p:sp>
         <p:nvSpPr>
-          <p:cNvPr id="32" name="PlaceHolder 2"/>
+          <p:cNvPr id="30" name="PlaceHolder 2"/>
           <p:cNvSpPr>
             <a:spLocks noGrp="1"/>
           </p:cNvSpPr>
@@ -394,7 +394,7 @@
       </p:sp>
       <p:sp>
         <p:nvSpPr>
-          <p:cNvPr id="33" name="PlaceHolder 3"/>
+          <p:cNvPr id="31" name="PlaceHolder 3"/>
           <p:cNvSpPr>
             <a:spLocks noGrp="1"/>
           </p:cNvSpPr>
@@ -424,7 +424,7 @@
       </p:sp>
       <p:sp>
         <p:nvSpPr>
-          <p:cNvPr id="34" name="PlaceHolder 4"/>
+          <p:cNvPr id="32" name="PlaceHolder 4"/>
           <p:cNvSpPr>
             <a:spLocks noGrp="1"/>
           </p:cNvSpPr>
@@ -454,7 +454,7 @@
       </p:sp>
       <p:sp>
         <p:nvSpPr>
-          <p:cNvPr id="35" name="PlaceHolder 5"/>
+          <p:cNvPr id="33" name="PlaceHolder 5"/>
           <p:cNvSpPr>
             <a:spLocks noGrp="1"/>
           </p:cNvSpPr>
@@ -484,7 +484,7 @@
       </p:sp>
       <p:sp>
         <p:nvSpPr>
-          <p:cNvPr id="36" name="PlaceHolder 6"/>
+          <p:cNvPr id="34" name="PlaceHolder 6"/>
           <p:cNvSpPr>
             <a:spLocks noGrp="1"/>
           </p:cNvSpPr>
@@ -514,7 +514,7 @@
       </p:sp>
       <p:sp>
         <p:nvSpPr>
-          <p:cNvPr id="37" name="PlaceHolder 7"/>
+          <p:cNvPr id="35" name="PlaceHolder 7"/>
           <p:cNvSpPr>
             <a:spLocks noGrp="1"/>
           </p:cNvSpPr>
@@ -566,7 +566,7 @@
       </p:grpSpPr>
       <p:sp>
         <p:nvSpPr>
-          <p:cNvPr id="2" name="PlaceHolder 1"/>
+          <p:cNvPr id="0" name="PlaceHolder 1"/>
           <p:cNvSpPr>
             <a:spLocks noGrp="1"/>
           </p:cNvSpPr>
@@ -595,7 +595,7 @@
       </p:sp>
       <p:sp>
         <p:nvSpPr>
-          <p:cNvPr id="3" name="PlaceHolder 2"/>
+          <p:cNvPr id="1" name="PlaceHolder 2"/>
           <p:cNvSpPr>
             <a:spLocks noGrp="1"/>
           </p:cNvSpPr>
@@ -646,7 +646,7 @@
       </p:grpSpPr>
       <p:sp>
         <p:nvSpPr>
-          <p:cNvPr id="4" name="PlaceHolder 1"/>
+          <p:cNvPr id="2" name="PlaceHolder 1"/>
           <p:cNvSpPr>
             <a:spLocks noGrp="1"/>
           </p:cNvSpPr>
@@ -675,7 +675,7 @@
       </p:sp>
       <p:sp>
         <p:nvSpPr>
-          <p:cNvPr id="5" name="PlaceHolder 2"/>
+          <p:cNvPr id="3" name="PlaceHolder 2"/>
           <p:cNvSpPr>
             <a:spLocks noGrp="1"/>
           </p:cNvSpPr>
@@ -727,7 +727,7 @@
       </p:grpSpPr>
       <p:sp>
         <p:nvSpPr>
-          <p:cNvPr id="6" name="PlaceHolder 1"/>
+          <p:cNvPr id="4" name="PlaceHolder 1"/>
           <p:cNvSpPr>
             <a:spLocks noGrp="1"/>
           </p:cNvSpPr>
@@ -756,7 +756,7 @@
       </p:sp>
       <p:sp>
         <p:nvSpPr>
-          <p:cNvPr id="7" name="PlaceHolder 2"/>
+          <p:cNvPr id="5" name="PlaceHolder 2"/>
           <p:cNvSpPr>
             <a:spLocks noGrp="1"/>
           </p:cNvSpPr>
@@ -786,7 +786,7 @@
       </p:sp>
       <p:sp>
         <p:nvSpPr>
-          <p:cNvPr id="8" name="PlaceHolder 3"/>
+          <p:cNvPr id="6" name="PlaceHolder 3"/>
           <p:cNvSpPr>
             <a:spLocks noGrp="1"/>
           </p:cNvSpPr>
@@ -838,7 +838,7 @@
       </p:grpSpPr>
       <p:sp>
         <p:nvSpPr>
-          <p:cNvPr id="9" name="PlaceHolder 1"/>
+          <p:cNvPr id="7" name="PlaceHolder 1"/>
           <p:cNvSpPr>
             <a:spLocks noGrp="1"/>
           </p:cNvSpPr>
@@ -889,7 +889,7 @@
       </p:grpSpPr>
       <p:sp>
         <p:nvSpPr>
-          <p:cNvPr id="10" name="PlaceHolder 1"/>
+          <p:cNvPr id="8" name="PlaceHolder 1"/>
           <p:cNvSpPr>
             <a:spLocks noGrp="1"/>
           </p:cNvSpPr>
@@ -940,7 +940,7 @@
       </p:grpSpPr>
       <p:sp>
         <p:nvSpPr>
-          <p:cNvPr id="11" name="PlaceHolder 1"/>
+          <p:cNvPr id="9" name="PlaceHolder 1"/>
           <p:cNvSpPr>
             <a:spLocks noGrp="1"/>
           </p:cNvSpPr>
@@ -969,7 +969,7 @@
       </p:sp>
       <p:sp>
         <p:nvSpPr>
-          <p:cNvPr id="12" name="PlaceHolder 2"/>
+          <p:cNvPr id="10" name="PlaceHolder 2"/>
           <p:cNvSpPr>
             <a:spLocks noGrp="1"/>
           </p:cNvSpPr>
@@ -999,7 +999,7 @@
       </p:sp>
       <p:sp>
         <p:nvSpPr>
-          <p:cNvPr id="13" name="PlaceHolder 3"/>
+          <p:cNvPr id="11" name="PlaceHolder 3"/>
           <p:cNvSpPr>
             <a:spLocks noGrp="1"/>
           </p:cNvSpPr>
@@ -1029,7 +1029,7 @@
       </p:sp>
       <p:sp>
         <p:nvSpPr>
-          <p:cNvPr id="14" name="PlaceHolder 4"/>
+          <p:cNvPr id="12" name="PlaceHolder 4"/>
           <p:cNvSpPr>
             <a:spLocks noGrp="1"/>
           </p:cNvSpPr>
@@ -1081,7 +1081,7 @@
       </p:grpSpPr>
       <p:sp>
         <p:nvSpPr>
-          <p:cNvPr id="15" name="PlaceHolder 1"/>
+          <p:cNvPr id="13" name="PlaceHolder 1"/>
           <p:cNvSpPr>
             <a:spLocks noGrp="1"/>
           </p:cNvSpPr>
@@ -1110,7 +1110,7 @@
       </p:sp>
       <p:sp>
         <p:nvSpPr>
-          <p:cNvPr id="16" name="PlaceHolder 2"/>
+          <p:cNvPr id="14" name="PlaceHolder 2"/>
           <p:cNvSpPr>
             <a:spLocks noGrp="1"/>
           </p:cNvSpPr>
@@ -1140,7 +1140,7 @@
       </p:sp>
       <p:sp>
         <p:nvSpPr>
-          <p:cNvPr id="17" name="PlaceHolder 3"/>
+          <p:cNvPr id="15" name="PlaceHolder 3"/>
           <p:cNvSpPr>
             <a:spLocks noGrp="1"/>
           </p:cNvSpPr>
@@ -1170,7 +1170,7 @@
       </p:sp>
       <p:sp>
         <p:nvSpPr>
-          <p:cNvPr id="18" name="PlaceHolder 4"/>
+          <p:cNvPr id="16" name="PlaceHolder 4"/>
           <p:cNvSpPr>
             <a:spLocks noGrp="1"/>
           </p:cNvSpPr>
@@ -1222,7 +1222,7 @@
       </p:grpSpPr>
       <p:sp>
         <p:nvSpPr>
-          <p:cNvPr id="19" name="PlaceHolder 1"/>
+          <p:cNvPr id="17" name="PlaceHolder 1"/>
           <p:cNvSpPr>
             <a:spLocks noGrp="1"/>
           </p:cNvSpPr>
@@ -1251,7 +1251,7 @@
       </p:sp>
       <p:sp>
         <p:nvSpPr>
-          <p:cNvPr id="20" name="PlaceHolder 2"/>
+          <p:cNvPr id="18" name="PlaceHolder 2"/>
           <p:cNvSpPr>
             <a:spLocks noGrp="1"/>
           </p:cNvSpPr>
@@ -1281,7 +1281,7 @@
       </p:sp>
       <p:sp>
         <p:nvSpPr>
-          <p:cNvPr id="21" name="PlaceHolder 3"/>
+          <p:cNvPr id="19" name="PlaceHolder 3"/>
           <p:cNvSpPr>
             <a:spLocks noGrp="1"/>
           </p:cNvSpPr>
@@ -1311,7 +1311,7 @@
       </p:sp>
       <p:sp>
         <p:nvSpPr>
-          <p:cNvPr id="22" name="PlaceHolder 4"/>
+          <p:cNvPr id="20" name="PlaceHolder 4"/>
           <p:cNvSpPr>
             <a:spLocks noGrp="1"/>
           </p:cNvSpPr>
@@ -1368,238 +1368,6 @@
           <a:chExt cx="0" cy="0"/>
         </a:xfrm>
       </p:grpSpPr>
-      <p:sp>
-        <p:nvSpPr>
-          <p:cNvPr id="0" name="PlaceHolder 1"/>
-          <p:cNvSpPr>
-            <a:spLocks noGrp="1"/>
-          </p:cNvSpPr>
-          <p:nvPr>
-            <p:ph type="title"/>
-          </p:nvPr>
-        </p:nvSpPr>
-        <p:spPr>
-          <a:xfrm>
-            <a:off x="720000" y="273600"/>
-            <a:ext cx="12959640" cy="1144800"/>
-          </a:xfrm>
-          <a:prstGeom prst="rect">
-            <a:avLst/>
-          </a:prstGeom>
-        </p:spPr>
-        <p:txBody>
-          <a:bodyPr lIns="0" rIns="0" tIns="0" bIns="0" anchor="ctr"/>
-          <a:p>
-            <a:pPr algn="ctr"/>
-            <a:r>
-              <a:rPr b="0" lang="en-SG" sz="4400" spc="-1" strike="noStrike">
-                <a:latin typeface="Arial"/>
-              </a:rPr>
-              <a:t>Click to </a:t>
-            </a:r>
-            <a:r>
-              <a:rPr b="0" lang="en-SG" sz="4400" spc="-1" strike="noStrike">
-                <a:latin typeface="Arial"/>
-              </a:rPr>
-              <a:t>edit the </a:t>
-            </a:r>
-            <a:r>
-              <a:rPr b="0" lang="en-SG" sz="4400" spc="-1" strike="noStrike">
-                <a:latin typeface="Arial"/>
-              </a:rPr>
-              <a:t>title text </a:t>
-            </a:r>
-            <a:r>
-              <a:rPr b="0" lang="en-SG" sz="4400" spc="-1" strike="noStrike">
-                <a:latin typeface="Arial"/>
-              </a:rPr>
-              <a:t>format</a:t>
-            </a:r>
-            <a:endParaRPr b="0" lang="en-SG" sz="4400" spc="-1" strike="noStrike">
-              <a:latin typeface="Arial"/>
-            </a:endParaRPr>
-          </a:p>
-        </p:txBody>
-      </p:sp>
-      <p:sp>
-        <p:nvSpPr>
-          <p:cNvPr id="1" name="PlaceHolder 2"/>
-          <p:cNvSpPr>
-            <a:spLocks noGrp="1"/>
-          </p:cNvSpPr>
-          <p:nvPr>
-            <p:ph type="body"/>
-          </p:nvPr>
-        </p:nvSpPr>
-        <p:spPr>
-          <a:xfrm>
-            <a:off x="720000" y="1604520"/>
-            <a:ext cx="12959640" cy="3977280"/>
-          </a:xfrm>
-          <a:prstGeom prst="rect">
-            <a:avLst/>
-          </a:prstGeom>
-        </p:spPr>
-        <p:txBody>
-          <a:bodyPr lIns="0" rIns="0" tIns="0" bIns="0">
-            <a:normAutofit/>
-          </a:bodyPr>
-          <a:p>
-            <a:pPr marL="432000" indent="-324000">
-              <a:spcBef>
-                <a:spcPts val="1417"/>
-              </a:spcBef>
-              <a:buClr>
-                <a:srgbClr val="000000"/>
-              </a:buClr>
-              <a:buSzPct val="45000"/>
-              <a:buFont typeface="Wingdings" charset="2"/>
-              <a:buChar char=""/>
-            </a:pPr>
-            <a:r>
-              <a:rPr b="0" lang="en-SG" sz="3200" spc="-1" strike="noStrike">
-                <a:latin typeface="Arial"/>
-              </a:rPr>
-              <a:t>Click to edit the outline text format</a:t>
-            </a:r>
-            <a:endParaRPr b="0" lang="en-SG" sz="3200" spc="-1" strike="noStrike">
-              <a:latin typeface="Arial"/>
-            </a:endParaRPr>
-          </a:p>
-          <a:p>
-            <a:pPr lvl="1" marL="864000" indent="-324000">
-              <a:spcBef>
-                <a:spcPts val="1134"/>
-              </a:spcBef>
-              <a:buClr>
-                <a:srgbClr val="000000"/>
-              </a:buClr>
-              <a:buSzPct val="75000"/>
-              <a:buFont typeface="Symbol" charset="2"/>
-              <a:buChar char=""/>
-            </a:pPr>
-            <a:r>
-              <a:rPr b="0" lang="en-SG" sz="2800" spc="-1" strike="noStrike">
-                <a:latin typeface="Arial"/>
-              </a:rPr>
-              <a:t>Second Outline Level</a:t>
-            </a:r>
-            <a:endParaRPr b="0" lang="en-SG" sz="2800" spc="-1" strike="noStrike">
-              <a:latin typeface="Arial"/>
-            </a:endParaRPr>
-          </a:p>
-          <a:p>
-            <a:pPr lvl="2" marL="1296000" indent="-288000">
-              <a:spcBef>
-                <a:spcPts val="850"/>
-              </a:spcBef>
-              <a:buClr>
-                <a:srgbClr val="000000"/>
-              </a:buClr>
-              <a:buSzPct val="45000"/>
-              <a:buFont typeface="Wingdings" charset="2"/>
-              <a:buChar char=""/>
-            </a:pPr>
-            <a:r>
-              <a:rPr b="0" lang="en-SG" sz="2400" spc="-1" strike="noStrike">
-                <a:latin typeface="Arial"/>
-              </a:rPr>
-              <a:t>Third Outline Level</a:t>
-            </a:r>
-            <a:endParaRPr b="0" lang="en-SG" sz="2400" spc="-1" strike="noStrike">
-              <a:latin typeface="Arial"/>
-            </a:endParaRPr>
-          </a:p>
-          <a:p>
-            <a:pPr lvl="3" marL="1728000" indent="-216000">
-              <a:spcBef>
-                <a:spcPts val="567"/>
-              </a:spcBef>
-              <a:buClr>
-                <a:srgbClr val="000000"/>
-              </a:buClr>
-              <a:buSzPct val="75000"/>
-              <a:buFont typeface="Symbol" charset="2"/>
-              <a:buChar char=""/>
-            </a:pPr>
-            <a:r>
-              <a:rPr b="0" lang="en-SG" sz="2000" spc="-1" strike="noStrike">
-                <a:latin typeface="Arial"/>
-              </a:rPr>
-              <a:t>Fourth Outline Level</a:t>
-            </a:r>
-            <a:endParaRPr b="0" lang="en-SG" sz="2000" spc="-1" strike="noStrike">
-              <a:latin typeface="Arial"/>
-            </a:endParaRPr>
-          </a:p>
-          <a:p>
-            <a:pPr lvl="4" marL="2160000" indent="-216000">
-              <a:spcBef>
-                <a:spcPts val="283"/>
-              </a:spcBef>
-              <a:buClr>
-                <a:srgbClr val="000000"/>
-              </a:buClr>
-              <a:buSzPct val="45000"/>
-              <a:buFont typeface="Wingdings" charset="2"/>
-              <a:buChar char=""/>
-            </a:pPr>
-            <a:r>
-              <a:rPr b="0" lang="en-SG" sz="2000" spc="-1" strike="noStrike">
-                <a:latin typeface="Arial"/>
-              </a:rPr>
-              <a:t>Fifth Outline Level</a:t>
-            </a:r>
-            <a:endParaRPr b="0" lang="en-SG" sz="2000" spc="-1" strike="noStrike">
-              <a:latin typeface="Arial"/>
-            </a:endParaRPr>
-          </a:p>
-          <a:p>
-            <a:pPr lvl="5" marL="2592000" indent="-216000">
-              <a:spcBef>
-                <a:spcPts val="283"/>
-              </a:spcBef>
-              <a:buClr>
-                <a:srgbClr val="000000"/>
-              </a:buClr>
-              <a:buSzPct val="45000"/>
-              <a:buFont typeface="Wingdings" charset="2"/>
-              <a:buChar char=""/>
-            </a:pPr>
-            <a:r>
-              <a:rPr b="0" lang="en-SG" sz="2000" spc="-1" strike="noStrike">
-                <a:latin typeface="Arial"/>
-              </a:rPr>
-              <a:t>Sixth Outline Level</a:t>
-            </a:r>
-            <a:endParaRPr b="0" lang="en-SG" sz="2000" spc="-1" strike="noStrike">
-              <a:latin typeface="Arial"/>
-            </a:endParaRPr>
-          </a:p>
-          <a:p>
-            <a:pPr lvl="6" marL="3024000" indent="-216000">
-              <a:spcBef>
-                <a:spcPts val="283"/>
-              </a:spcBef>
-              <a:buClr>
-                <a:srgbClr val="000000"/>
-              </a:buClr>
-              <a:buSzPct val="45000"/>
-              <a:buFont typeface="Wingdings" charset="2"/>
-              <a:buChar char=""/>
-            </a:pPr>
-            <a:r>
-              <a:rPr b="0" lang="en-SG" sz="2000" spc="-1" strike="noStrike">
-                <a:latin typeface="Arial"/>
-              </a:rPr>
-              <a:t>Seventh Outline Level</a:t>
-            </a:r>
-            <a:endParaRPr b="0" lang="en-SG" sz="2000" spc="-1" strike="noStrike">
-              <a:latin typeface="Arial"/>
-            </a:endParaRPr>
-          </a:p>
-        </p:txBody>
-      </p:sp>
     </p:spTree>
   </p:cSld>
   <p:clrMap bg1="lt1" bg2="lt2" tx1="dk1" tx2="dk2" accent1="accent1" accent2="accent2" accent3="accent3" accent4="accent4" accent5="accent5" accent6="accent6" hlink="hlink" folHlink="folHlink"/>
@@ -1639,14 +1407,14 @@
       </p:grpSpPr>
       <p:sp>
         <p:nvSpPr>
-          <p:cNvPr id="38" name="CustomShape 1"/>
+          <p:cNvPr id="36" name="CustomShape 1"/>
           <p:cNvSpPr/>
           <p:nvPr/>
         </p:nvSpPr>
         <p:spPr>
           <a:xfrm>
             <a:off x="7467840" y="1290240"/>
-            <a:ext cx="2478600" cy="3794760"/>
+            <a:ext cx="2478240" cy="3794400"/>
           </a:xfrm>
           <a:prstGeom prst="roundRect">
             <a:avLst>
@@ -1705,14 +1473,14 @@
       </p:sp>
       <p:sp>
         <p:nvSpPr>
-          <p:cNvPr id="39" name="CustomShape 2"/>
+          <p:cNvPr id="37" name="CustomShape 2"/>
           <p:cNvSpPr/>
           <p:nvPr/>
         </p:nvSpPr>
         <p:spPr>
           <a:xfrm>
             <a:off x="7659720" y="1664640"/>
-            <a:ext cx="2141280" cy="735480"/>
+            <a:ext cx="2140920" cy="735120"/>
           </a:xfrm>
           <a:prstGeom prst="rect">
             <a:avLst/>
@@ -1772,7 +1540,7 @@
       </p:sp>
       <p:sp>
         <p:nvSpPr>
-          <p:cNvPr id="40" name="Line 3"/>
+          <p:cNvPr id="38" name="Line 3"/>
           <p:cNvSpPr/>
           <p:nvPr/>
         </p:nvSpPr>
@@ -1809,14 +1577,14 @@
       </p:sp>
       <p:sp>
         <p:nvSpPr>
-          <p:cNvPr id="41" name="CustomShape 4"/>
+          <p:cNvPr id="39" name="CustomShape 4"/>
           <p:cNvSpPr/>
           <p:nvPr/>
         </p:nvSpPr>
         <p:spPr>
           <a:xfrm>
             <a:off x="8653320" y="2778120"/>
-            <a:ext cx="207720" cy="1940400"/>
+            <a:ext cx="207360" cy="1940040"/>
           </a:xfrm>
           <a:prstGeom prst="rect">
             <a:avLst/>
@@ -1853,14 +1621,14 @@
       </p:sp>
       <p:sp>
         <p:nvSpPr>
-          <p:cNvPr id="42" name="CustomShape 5"/>
+          <p:cNvPr id="40" name="CustomShape 5"/>
           <p:cNvSpPr/>
           <p:nvPr/>
         </p:nvSpPr>
         <p:spPr>
           <a:xfrm flipV="1">
-            <a:off x="7282800" y="2777760"/>
-            <a:ext cx="1397880" cy="360"/>
+            <a:off x="7282800" y="2777040"/>
+            <a:ext cx="1397520" cy="360"/>
           </a:xfrm>
           <a:custGeom>
             <a:avLst/>
@@ -1902,14 +1670,14 @@
       </p:sp>
       <p:sp>
         <p:nvSpPr>
-          <p:cNvPr id="43" name="CustomShape 6"/>
+          <p:cNvPr id="41" name="CustomShape 6"/>
           <p:cNvSpPr/>
           <p:nvPr/>
         </p:nvSpPr>
         <p:spPr>
           <a:xfrm flipV="1">
-            <a:off x="7282800" y="4718520"/>
-            <a:ext cx="1391400" cy="2880"/>
+            <a:off x="7282800" y="4717800"/>
+            <a:ext cx="1391040" cy="2520"/>
           </a:xfrm>
           <a:custGeom>
             <a:avLst/>
@@ -1954,14 +1722,14 @@
       </p:sp>
       <p:sp>
         <p:nvSpPr>
-          <p:cNvPr id="44" name="CustomShape 7"/>
+          <p:cNvPr id="42" name="CustomShape 7"/>
           <p:cNvSpPr/>
           <p:nvPr/>
         </p:nvSpPr>
         <p:spPr>
           <a:xfrm>
             <a:off x="6352920" y="2565360"/>
-            <a:ext cx="2174040" cy="182160"/>
+            <a:ext cx="2173680" cy="181800"/>
           </a:xfrm>
           <a:prstGeom prst="rect">
             <a:avLst/>
@@ -1993,7 +1761,7 @@
                 <a:latin typeface="Calibri"/>
                 <a:ea typeface="DejaVu Sans"/>
               </a:rPr>
-              <a:t>playerPerformAttack(a1)</a:t>
+              <a:t>humanPerformAttack(a1)</a:t>
             </a:r>
             <a:endParaRPr b="0" lang="en-SG" sz="1200" spc="-1" strike="noStrike">
               <a:latin typeface="Arial"/>
@@ -2003,14 +1771,14 @@
       </p:sp>
       <p:sp>
         <p:nvSpPr>
-          <p:cNvPr id="45" name="CustomShape 8"/>
+          <p:cNvPr id="43" name="CustomShape 8"/>
           <p:cNvSpPr/>
           <p:nvPr/>
         </p:nvSpPr>
         <p:spPr>
           <a:xfrm>
             <a:off x="8509680" y="3169080"/>
-            <a:ext cx="1814400" cy="923400"/>
+            <a:ext cx="1814040" cy="923040"/>
           </a:xfrm>
           <a:prstGeom prst="roundRect">
             <a:avLst>
@@ -2072,27 +1840,27 @@
       </p:sp>
       <p:grpSp>
         <p:nvGrpSpPr>
-          <p:cNvPr id="46" name="Group 9"/>
+          <p:cNvPr id="44" name="Group 9"/>
           <p:cNvGrpSpPr/>
           <p:nvPr/>
         </p:nvGrpSpPr>
         <p:grpSpPr>
           <a:xfrm>
-            <a:off x="8509680" y="3169080"/>
+            <a:off x="8509680" y="3168720"/>
             <a:ext cx="698040" cy="436680"/>
-            <a:chOff x="8509680" y="3169080"/>
+            <a:chOff x="8509680" y="3168720"/>
             <a:chExt cx="698040" cy="436680"/>
           </a:xfrm>
         </p:grpSpPr>
         <p:sp>
           <p:nvSpPr>
-            <p:cNvPr id="47" name="Line 10"/>
+            <p:cNvPr id="45" name="Line 10"/>
             <p:cNvSpPr/>
             <p:nvPr/>
           </p:nvSpPr>
           <p:spPr>
             <a:xfrm>
-              <a:off x="8509680" y="3605400"/>
+              <a:off x="8509680" y="3605040"/>
               <a:ext cx="608760" cy="360"/>
             </a:xfrm>
             <a:prstGeom prst="line">
@@ -2120,13 +1888,13 @@
         </p:sp>
         <p:sp>
           <p:nvSpPr>
-            <p:cNvPr id="48" name="Line 11"/>
+            <p:cNvPr id="46" name="Line 11"/>
             <p:cNvSpPr/>
             <p:nvPr/>
           </p:nvSpPr>
           <p:spPr>
             <a:xfrm flipV="1">
-              <a:off x="9118440" y="3487680"/>
+              <a:off x="9118440" y="3487320"/>
               <a:ext cx="89280" cy="117720"/>
             </a:xfrm>
             <a:prstGeom prst="line">
@@ -2154,13 +1922,13 @@
         </p:sp>
         <p:sp>
           <p:nvSpPr>
-            <p:cNvPr id="49" name="Line 12"/>
+            <p:cNvPr id="47" name="Line 12"/>
             <p:cNvSpPr/>
             <p:nvPr/>
           </p:nvSpPr>
           <p:spPr>
             <a:xfrm flipV="1">
-              <a:off x="9203040" y="3169080"/>
+              <a:off x="9203040" y="3168720"/>
               <a:ext cx="360" cy="318600"/>
             </a:xfrm>
             <a:prstGeom prst="line">
@@ -2189,14 +1957,14 @@
       </p:grpSp>
       <p:sp>
         <p:nvSpPr>
-          <p:cNvPr id="50" name="CustomShape 13"/>
+          <p:cNvPr id="48" name="CustomShape 13"/>
           <p:cNvSpPr/>
           <p:nvPr/>
         </p:nvSpPr>
         <p:spPr>
           <a:xfrm>
             <a:off x="8861040" y="3503520"/>
-            <a:ext cx="1814400" cy="486720"/>
+            <a:ext cx="1814040" cy="486360"/>
           </a:xfrm>
           <a:prstGeom prst="rect">
             <a:avLst/>
@@ -2226,116 +1994,9 @@
                   <a:srgbClr val="ffffff"/>
                 </a:solidFill>
                 <a:latin typeface="Arial"/>
+                <a:ea typeface="DejaVu Sans"/>
               </a:rPr>
-              <a:t>p</a:t>
-            </a:r>
-            <a:r>
-              <a:rPr b="0" lang="en-SG" sz="1400" spc="-1" strike="noStrike">
-                <a:solidFill>
-                  <a:srgbClr val="ffffff"/>
-                </a:solidFill>
-                <a:latin typeface="Arial"/>
-              </a:rPr>
-              <a:t>e</a:t>
-            </a:r>
-            <a:r>
-              <a:rPr b="0" lang="en-SG" sz="1400" spc="-1" strike="noStrike">
-                <a:solidFill>
-                  <a:srgbClr val="ffffff"/>
-                </a:solidFill>
-                <a:latin typeface="Arial"/>
-              </a:rPr>
-              <a:t>r</a:t>
-            </a:r>
-            <a:r>
-              <a:rPr b="0" lang="en-SG" sz="1400" spc="-1" strike="noStrike">
-                <a:solidFill>
-                  <a:srgbClr val="ffffff"/>
-                </a:solidFill>
-                <a:latin typeface="Arial"/>
-              </a:rPr>
-              <a:t>f</a:t>
-            </a:r>
-            <a:r>
-              <a:rPr b="0" lang="en-SG" sz="1400" spc="-1" strike="noStrike">
-                <a:solidFill>
-                  <a:srgbClr val="ffffff"/>
-                </a:solidFill>
-                <a:latin typeface="Arial"/>
-              </a:rPr>
-              <a:t>o</a:t>
-            </a:r>
-            <a:r>
-              <a:rPr b="0" lang="en-SG" sz="1400" spc="-1" strike="noStrike">
-                <a:solidFill>
-                  <a:srgbClr val="ffffff"/>
-                </a:solidFill>
-                <a:latin typeface="Arial"/>
-              </a:rPr>
-              <a:t>r</a:t>
-            </a:r>
-            <a:r>
-              <a:rPr b="0" lang="en-SG" sz="1400" spc="-1" strike="noStrike">
-                <a:solidFill>
-                  <a:srgbClr val="ffffff"/>
-                </a:solidFill>
-                <a:latin typeface="Arial"/>
-              </a:rPr>
-              <a:t>m</a:t>
-            </a:r>
-            <a:r>
-              <a:rPr b="0" lang="en-SG" sz="1400" spc="-1" strike="noStrike">
-                <a:solidFill>
-                  <a:srgbClr val="ffffff"/>
-                </a:solidFill>
-                <a:latin typeface="Arial"/>
-              </a:rPr>
-              <a:t>A</a:t>
-            </a:r>
-            <a:r>
-              <a:rPr b="0" lang="en-SG" sz="1400" spc="-1" strike="noStrike">
-                <a:solidFill>
-                  <a:srgbClr val="ffffff"/>
-                </a:solidFill>
-                <a:latin typeface="Arial"/>
-              </a:rPr>
-              <a:t>t</a:t>
-            </a:r>
-            <a:r>
-              <a:rPr b="0" lang="en-SG" sz="1400" spc="-1" strike="noStrike">
-                <a:solidFill>
-                  <a:srgbClr val="ffffff"/>
-                </a:solidFill>
-                <a:latin typeface="Arial"/>
-              </a:rPr>
-              <a:t>t</a:t>
-            </a:r>
-            <a:r>
-              <a:rPr b="0" lang="en-SG" sz="1400" spc="-1" strike="noStrike">
-                <a:solidFill>
-                  <a:srgbClr val="ffffff"/>
-                </a:solidFill>
-                <a:latin typeface="Arial"/>
-              </a:rPr>
-              <a:t>a</a:t>
-            </a:r>
-            <a:r>
-              <a:rPr b="0" lang="en-SG" sz="1400" spc="-1" strike="noStrike">
-                <a:solidFill>
-                  <a:srgbClr val="ffffff"/>
-                </a:solidFill>
-                <a:latin typeface="Arial"/>
-              </a:rPr>
-              <a:t>c</a:t>
-            </a:r>
-            <a:r>
-              <a:rPr b="0" lang="en-SG" sz="1400" spc="-1" strike="noStrike">
-                <a:solidFill>
-                  <a:srgbClr val="ffffff"/>
-                </a:solidFill>
-                <a:latin typeface="Arial"/>
-              </a:rPr>
-              <a:t>k</a:t>
+              <a:t>performAttack</a:t>
             </a:r>
             <a:endParaRPr b="0" lang="en-SG" sz="1400" spc="-1" strike="noStrike">
               <a:latin typeface="Arial"/>
@@ -2345,20 +2006,20 @@
       </p:sp>
       <p:sp>
         <p:nvSpPr>
-          <p:cNvPr id="51" name="Freeform 14"/>
+          <p:cNvPr id="49" name="CustomShape 14"/>
           <p:cNvSpPr/>
           <p:nvPr/>
         </p:nvSpPr>
         <p:spPr>
           <a:xfrm>
             <a:off x="8861040" y="2778120"/>
-            <a:ext cx="385920" cy="391320"/>
+            <a:ext cx="385560" cy="390960"/>
           </a:xfrm>
           <a:custGeom>
             <a:avLst/>
             <a:gdLst/>
             <a:ahLst/>
-            <a:rect l="0" t="0" r="r" b="b"/>
+            <a:rect l="l" t="t" r="r" b="b"/>
             <a:pathLst>
               <a:path w="1072" h="1087">
                 <a:moveTo>
@@ -2372,6 +2033,7 @@
               </a:path>
             </a:pathLst>
           </a:custGeom>
+          <a:noFill/>
           <a:ln w="18360">
             <a:solidFill>
               <a:srgbClr val="009999"/>
@@ -2380,23 +2042,29 @@
             <a:tailEnd len="med" type="triangle" w="med"/>
           </a:ln>
         </p:spPr>
-      </p:sp>
-      <p:sp>
-        <p:nvSpPr>
-          <p:cNvPr id="52" name="Freeform 15"/>
+        <p:style>
+          <a:lnRef idx="0"/>
+          <a:fillRef idx="0"/>
+          <a:effectRef idx="0"/>
+          <a:fontRef idx="minor"/>
+        </p:style>
+      </p:sp>
+      <p:sp>
+        <p:nvSpPr>
+          <p:cNvPr id="50" name="CustomShape 15"/>
           <p:cNvSpPr/>
           <p:nvPr/>
         </p:nvSpPr>
         <p:spPr>
           <a:xfrm>
             <a:off x="8861040" y="4092480"/>
-            <a:ext cx="444600" cy="392040"/>
+            <a:ext cx="444240" cy="391680"/>
           </a:xfrm>
           <a:custGeom>
             <a:avLst/>
             <a:gdLst/>
             <a:ahLst/>
-            <a:rect l="0" t="0" r="r" b="b"/>
+            <a:rect l="l" t="t" r="r" b="b"/>
             <a:pathLst>
               <a:path w="1235" h="1089">
                 <a:moveTo>
@@ -2410,7 +2078,8 @@
               </a:path>
             </a:pathLst>
           </a:custGeom>
-          <a:ln w="18360">
+          <a:noFill/>
+          <a:ln cap="rnd" w="18360">
             <a:solidFill>
               <a:srgbClr val="009999"/>
             </a:solidFill>
@@ -2421,17 +2090,23 @@
             <a:tailEnd len="med" type="triangle" w="med"/>
           </a:ln>
         </p:spPr>
-      </p:sp>
-      <p:sp>
-        <p:nvSpPr>
-          <p:cNvPr id="53" name="CustomShape 16"/>
+        <p:style>
+          <a:lnRef idx="0"/>
+          <a:fillRef idx="0"/>
+          <a:effectRef idx="0"/>
+          <a:fontRef idx="minor"/>
+        </p:style>
+      </p:sp>
+      <p:sp>
+        <p:nvSpPr>
+          <p:cNvPr id="51" name="CustomShape 16"/>
           <p:cNvSpPr/>
           <p:nvPr/>
         </p:nvSpPr>
         <p:spPr>
           <a:xfrm>
             <a:off x="9065520" y="2705040"/>
-            <a:ext cx="1586160" cy="900360"/>
+            <a:ext cx="1585800" cy="900000"/>
           </a:xfrm>
           <a:prstGeom prst="rect">
             <a:avLst/>
@@ -2493,14 +2168,14 @@
       </p:sp>
       <p:sp>
         <p:nvSpPr>
-          <p:cNvPr id="54" name="CustomShape 17"/>
+          <p:cNvPr id="52" name="CustomShape 17"/>
           <p:cNvSpPr/>
           <p:nvPr/>
         </p:nvSpPr>
         <p:spPr>
           <a:xfrm>
             <a:off x="7772400" y="4484160"/>
-            <a:ext cx="2174040" cy="182160"/>
+            <a:ext cx="2173680" cy="181800"/>
           </a:xfrm>
           <a:prstGeom prst="rect">
             <a:avLst/>

</xml_diff>